<commit_message>
Update backendUIOverview with api calls consistent with base code
</commit_message>
<xml_diff>
--- a/images/backendUIOverview.pptx
+++ b/images/backendUIOverview.pptx
@@ -212,7 +212,7 @@
             <a:fld id="{5D8FA8FF-20DC-44E5-8C35-13EAF0A5698C}" type="datetimeFigureOut">
               <a:rPr lang="en-SG" smtClean="0"/>
               <a:pPr/>
-              <a:t>14/11/18</a:t>
+              <a:t>9/9/2019</a:t>
             </a:fld>
             <a:endParaRPr lang="en-SG"/>
           </a:p>
@@ -661,7 +661,7 @@
             <a:fld id="{1D8BD707-D9CF-40AE-B4C6-C98DA3205C09}" type="datetimeFigureOut">
               <a:rPr lang="en-US" smtClean="0"/>
               <a:pPr/>
-              <a:t>11/14/18</a:t>
+              <a:t>9/9/2019</a:t>
             </a:fld>
             <a:endParaRPr lang="en-US"/>
           </a:p>
@@ -826,7 +826,7 @@
             <a:fld id="{1D8BD707-D9CF-40AE-B4C6-C98DA3205C09}" type="datetimeFigureOut">
               <a:rPr lang="en-US" smtClean="0"/>
               <a:pPr/>
-              <a:t>11/14/18</a:t>
+              <a:t>9/9/2019</a:t>
             </a:fld>
             <a:endParaRPr lang="en-US"/>
           </a:p>
@@ -1001,7 +1001,7 @@
             <a:fld id="{1D8BD707-D9CF-40AE-B4C6-C98DA3205C09}" type="datetimeFigureOut">
               <a:rPr lang="en-US" smtClean="0"/>
               <a:pPr/>
-              <a:t>11/14/18</a:t>
+              <a:t>9/9/2019</a:t>
             </a:fld>
             <a:endParaRPr lang="en-US"/>
           </a:p>
@@ -1166,7 +1166,7 @@
             <a:fld id="{1D8BD707-D9CF-40AE-B4C6-C98DA3205C09}" type="datetimeFigureOut">
               <a:rPr lang="en-US" smtClean="0"/>
               <a:pPr/>
-              <a:t>11/14/18</a:t>
+              <a:t>9/9/2019</a:t>
             </a:fld>
             <a:endParaRPr lang="en-US"/>
           </a:p>
@@ -1408,7 +1408,7 @@
             <a:fld id="{1D8BD707-D9CF-40AE-B4C6-C98DA3205C09}" type="datetimeFigureOut">
               <a:rPr lang="en-US" smtClean="0"/>
               <a:pPr/>
-              <a:t>11/14/18</a:t>
+              <a:t>9/9/2019</a:t>
             </a:fld>
             <a:endParaRPr lang="en-US"/>
           </a:p>
@@ -1690,7 +1690,7 @@
             <a:fld id="{1D8BD707-D9CF-40AE-B4C6-C98DA3205C09}" type="datetimeFigureOut">
               <a:rPr lang="en-US" smtClean="0"/>
               <a:pPr/>
-              <a:t>11/14/18</a:t>
+              <a:t>9/9/2019</a:t>
             </a:fld>
             <a:endParaRPr lang="en-US"/>
           </a:p>
@@ -2106,7 +2106,7 @@
             <a:fld id="{1D8BD707-D9CF-40AE-B4C6-C98DA3205C09}" type="datetimeFigureOut">
               <a:rPr lang="en-US" smtClean="0"/>
               <a:pPr/>
-              <a:t>11/14/18</a:t>
+              <a:t>9/9/2019</a:t>
             </a:fld>
             <a:endParaRPr lang="en-US"/>
           </a:p>
@@ -2220,7 +2220,7 @@
             <a:fld id="{1D8BD707-D9CF-40AE-B4C6-C98DA3205C09}" type="datetimeFigureOut">
               <a:rPr lang="en-US" smtClean="0"/>
               <a:pPr/>
-              <a:t>11/14/18</a:t>
+              <a:t>9/9/2019</a:t>
             </a:fld>
             <a:endParaRPr lang="en-US"/>
           </a:p>
@@ -2312,7 +2312,7 @@
             <a:fld id="{1D8BD707-D9CF-40AE-B4C6-C98DA3205C09}" type="datetimeFigureOut">
               <a:rPr lang="en-US" smtClean="0"/>
               <a:pPr/>
-              <a:t>11/14/18</a:t>
+              <a:t>9/9/2019</a:t>
             </a:fld>
             <a:endParaRPr lang="en-US"/>
           </a:p>
@@ -2584,7 +2584,7 @@
             <a:fld id="{1D8BD707-D9CF-40AE-B4C6-C98DA3205C09}" type="datetimeFigureOut">
               <a:rPr lang="en-US" smtClean="0"/>
               <a:pPr/>
-              <a:t>11/14/18</a:t>
+              <a:t>9/9/2019</a:t>
             </a:fld>
             <a:endParaRPr lang="en-US"/>
           </a:p>
@@ -2833,7 +2833,7 @@
             <a:fld id="{1D8BD707-D9CF-40AE-B4C6-C98DA3205C09}" type="datetimeFigureOut">
               <a:rPr lang="en-US" smtClean="0"/>
               <a:pPr/>
-              <a:t>11/14/18</a:t>
+              <a:t>9/9/2019</a:t>
             </a:fld>
             <a:endParaRPr lang="en-US"/>
           </a:p>
@@ -3041,7 +3041,7 @@
             <a:fld id="{1D8BD707-D9CF-40AE-B4C6-C98DA3205C09}" type="datetimeFigureOut">
               <a:rPr lang="en-US" smtClean="0"/>
               <a:pPr/>
-              <a:t>11/14/18</a:t>
+              <a:t>9/9/2019</a:t>
             </a:fld>
             <a:endParaRPr lang="en-US"/>
           </a:p>
@@ -3907,7 +3907,7 @@
           <a:lstStyle/>
           <a:p>
             <a:r>
-              <a:rPr lang="en-US" b="1" dirty="0" smtClean="0">
+              <a:rPr lang="en-US" b="1" dirty="0">
                 <a:solidFill>
                   <a:schemeClr val="accent5"/>
                 </a:solidFill>
@@ -3915,7 +3915,7 @@
               <a:t>POST</a:t>
             </a:r>
             <a:r>
-              <a:rPr lang="en-US" dirty="0" smtClean="0">
+              <a:rPr lang="en-US" dirty="0">
                 <a:solidFill>
                   <a:schemeClr val="accent5"/>
                 </a:solidFill>
@@ -3923,20 +3923,16 @@
               <a:t> </a:t>
             </a:r>
             <a:r>
-              <a:rPr lang="en-US" dirty="0" smtClean="0"/>
+              <a:rPr lang="en-US" dirty="0"/>
               <a:t>/</a:t>
             </a:r>
             <a:r>
-              <a:rPr lang="en-US" dirty="0" err="1" smtClean="0"/>
+              <a:rPr lang="en-US" dirty="0" err="1"/>
               <a:t>api</a:t>
             </a:r>
             <a:r>
-              <a:rPr lang="en-US" dirty="0" smtClean="0"/>
-              <a:t>/presentations</a:t>
-            </a:r>
-            <a:r>
               <a:rPr lang="en-US" dirty="0"/>
-              <a:t>/{id}/analysis</a:t>
+              <a:t>/presentations/{id}/analysis</a:t>
             </a:r>
           </a:p>
         </p:txBody>
@@ -3964,7 +3960,7 @@
           <a:lstStyle/>
           <a:p>
             <a:r>
-              <a:rPr lang="en-US" b="1" dirty="0" smtClean="0">
+              <a:rPr lang="en-US" b="1" dirty="0">
                 <a:solidFill>
                   <a:schemeClr val="accent3"/>
                 </a:solidFill>
@@ -3972,7 +3968,7 @@
               <a:t>GET</a:t>
             </a:r>
             <a:r>
-              <a:rPr lang="en-US" b="1" dirty="0" smtClean="0">
+              <a:rPr lang="en-US" b="1" dirty="0">
                 <a:solidFill>
                   <a:schemeClr val="accent5"/>
                 </a:solidFill>
@@ -3980,19 +3976,19 @@
               <a:t> </a:t>
             </a:r>
             <a:r>
-              <a:rPr lang="en-US" dirty="0" smtClean="0"/>
+              <a:rPr lang="en-US" dirty="0"/>
               <a:t>/</a:t>
             </a:r>
             <a:r>
-              <a:rPr lang="en-US" dirty="0" err="1" smtClean="0"/>
+              <a:rPr lang="en-US" dirty="0" err="1"/>
               <a:t>api</a:t>
             </a:r>
             <a:r>
-              <a:rPr lang="en-US" dirty="0" smtClean="0"/>
+              <a:rPr lang="en-US" dirty="0"/>
               <a:t>/</a:t>
             </a:r>
             <a:r>
-              <a:rPr lang="en-US" dirty="0" err="1" smtClean="0"/>
+              <a:rPr lang="en-US" dirty="0" err="1"/>
               <a:t>auth</a:t>
             </a:r>
             <a:endParaRPr lang="en-US" dirty="0"/>
@@ -4022,7 +4018,7 @@
           <a:lstStyle/>
           <a:p>
             <a:r>
-              <a:rPr lang="en-US" b="1" dirty="0" smtClean="0">
+              <a:rPr lang="en-US" b="1" dirty="0">
                 <a:solidFill>
                   <a:schemeClr val="accent3"/>
                 </a:solidFill>
@@ -4030,7 +4026,7 @@
               <a:t>GET</a:t>
             </a:r>
             <a:r>
-              <a:rPr lang="en-US" b="1" dirty="0" smtClean="0">
+              <a:rPr lang="en-US" b="1" dirty="0">
                 <a:solidFill>
                   <a:schemeClr val="accent5"/>
                 </a:solidFill>
@@ -4038,26 +4034,25 @@
               <a:t> </a:t>
             </a:r>
             <a:r>
-              <a:rPr lang="en-US" dirty="0" smtClean="0"/>
+              <a:rPr lang="en-US" dirty="0"/>
               <a:t>/</a:t>
             </a:r>
             <a:r>
-              <a:rPr lang="en-US" dirty="0" err="1" smtClean="0"/>
+              <a:rPr lang="en-US" dirty="0" err="1"/>
               <a:t>api</a:t>
             </a:r>
             <a:r>
-              <a:rPr lang="en-US" dirty="0" smtClean="0"/>
+              <a:rPr lang="en-US" dirty="0"/>
               <a:t>/</a:t>
             </a:r>
             <a:r>
-              <a:rPr lang="en-US" dirty="0" err="1" smtClean="0"/>
+              <a:rPr lang="en-US" dirty="0" err="1"/>
               <a:t>db</a:t>
             </a:r>
             <a:r>
-              <a:rPr lang="en-US" dirty="0" smtClean="0"/>
+              <a:rPr lang="en-US" dirty="0"/>
               <a:t>/entity</a:t>
             </a:r>
-            <a:endParaRPr lang="en-US" dirty="0"/>
           </a:p>
         </p:txBody>
       </p:sp>
@@ -4088,7 +4083,7 @@
           <a:lstStyle/>
           <a:p>
             <a:r>
-              <a:rPr lang="en-US" sz="1200" b="1" dirty="0" smtClean="0">
+              <a:rPr lang="en-US" sz="1200" b="1" dirty="0">
                 <a:solidFill>
                   <a:schemeClr val="accent3"/>
                 </a:solidFill>
@@ -4096,7 +4091,7 @@
               <a:t>GET</a:t>
             </a:r>
             <a:r>
-              <a:rPr lang="en-US" sz="1200" b="1" dirty="0" smtClean="0">
+              <a:rPr lang="en-US" sz="1200" b="1" dirty="0">
                 <a:solidFill>
                   <a:schemeClr val="accent5"/>
                 </a:solidFill>
@@ -4104,16 +4099,106 @@
               <a:t> </a:t>
             </a:r>
             <a:r>
-              <a:rPr lang="en-US" sz="1200" dirty="0" smtClean="0"/>
+              <a:rPr lang="en-US" sz="1200" dirty="0"/>
               <a:t>/</a:t>
             </a:r>
             <a:r>
-              <a:rPr lang="en-US" sz="1200" dirty="0" err="1" smtClean="0"/>
+              <a:rPr lang="en-US" sz="1200" dirty="0" err="1"/>
               <a:t>api</a:t>
             </a:r>
             <a:r>
-              <a:rPr lang="en-US" sz="1200" dirty="0" smtClean="0"/>
-              <a:t>/presentations</a:t>
+              <a:rPr lang="en-US" sz="1200" dirty="0"/>
+              <a:t>/presentations/{</a:t>
+            </a:r>
+            <a:r>
+              <a:rPr lang="en-US" sz="1200" dirty="0" err="1"/>
+              <a:t>presentationId</a:t>
+            </a:r>
+            <a:r>
+              <a:rPr lang="en-US" sz="1200" dirty="0"/>
+              <a:t>}/</a:t>
+            </a:r>
+            <a:r>
+              <a:rPr lang="en-US" sz="1200" dirty="0" err="1"/>
+              <a:t>accessControl</a:t>
+            </a:r>
+            <a:endParaRPr lang="en-US" sz="1200" dirty="0"/>
+          </a:p>
+          <a:p>
+            <a:r>
+              <a:rPr lang="en-US" sz="1200" b="1" dirty="0">
+                <a:solidFill>
+                  <a:schemeClr val="accent5"/>
+                </a:solidFill>
+              </a:rPr>
+              <a:t>POST </a:t>
+            </a:r>
+            <a:r>
+              <a:rPr lang="en-US" sz="1200" dirty="0"/>
+              <a:t>/</a:t>
+            </a:r>
+            <a:r>
+              <a:rPr lang="en-US" sz="1200" dirty="0" err="1"/>
+              <a:t>api</a:t>
+            </a:r>
+            <a:r>
+              <a:rPr lang="en-US" sz="1200" dirty="0"/>
+              <a:t>/presentations/{</a:t>
+            </a:r>
+            <a:r>
+              <a:rPr lang="en-US" sz="1200" dirty="0" err="1"/>
+              <a:t>presentationId</a:t>
+            </a:r>
+            <a:r>
+              <a:rPr lang="en-US" sz="1200" dirty="0"/>
+              <a:t>}/</a:t>
+            </a:r>
+            <a:r>
+              <a:rPr lang="en-US" sz="1200" dirty="0" err="1"/>
+              <a:t>accessControl</a:t>
+            </a:r>
+            <a:endParaRPr lang="en-US" sz="1200" dirty="0"/>
+          </a:p>
+          <a:p>
+            <a:r>
+              <a:rPr lang="en-US" sz="1200" b="1" dirty="0">
+                <a:solidFill>
+                  <a:schemeClr val="accent6"/>
+                </a:solidFill>
+              </a:rPr>
+              <a:t>PUT</a:t>
+            </a:r>
+            <a:r>
+              <a:rPr lang="en-US" sz="1200" b="1" dirty="0">
+                <a:solidFill>
+                  <a:schemeClr val="accent3"/>
+                </a:solidFill>
+              </a:rPr>
+              <a:t> </a:t>
+            </a:r>
+            <a:r>
+              <a:rPr lang="en-US" sz="1200" dirty="0"/>
+              <a:t>/</a:t>
+            </a:r>
+            <a:r>
+              <a:rPr lang="en-US" sz="1200" dirty="0" err="1"/>
+              <a:t>api</a:t>
+            </a:r>
+            <a:r>
+              <a:rPr lang="en-US" sz="1200" dirty="0"/>
+              <a:t>/presentations/{</a:t>
+            </a:r>
+            <a:r>
+              <a:rPr lang="en-US" sz="1200" dirty="0" err="1"/>
+              <a:t>presentationId</a:t>
+            </a:r>
+            <a:r>
+              <a:rPr lang="en-US" sz="1200" dirty="0"/>
+              <a:t>}/</a:t>
+            </a:r>
+            <a:r>
+              <a:rPr lang="en-US" sz="1200" dirty="0" err="1"/>
+              <a:t>accessControl</a:t>
             </a:r>
             <a:r>
               <a:rPr lang="en-US" sz="1200" dirty="0"/>
@@ -4121,6 +4206,44 @@
             </a:r>
             <a:r>
               <a:rPr lang="en-US" sz="1200" dirty="0" err="1"/>
+              <a:t>accessControlId</a:t>
+            </a:r>
+            <a:r>
+              <a:rPr lang="en-US" sz="1200" dirty="0"/>
+              <a:t>}</a:t>
+            </a:r>
+          </a:p>
+          <a:p>
+            <a:r>
+              <a:rPr lang="en-US" sz="1200" b="1" dirty="0">
+                <a:solidFill>
+                  <a:schemeClr val="accent2"/>
+                </a:solidFill>
+              </a:rPr>
+              <a:t>DELETE</a:t>
+            </a:r>
+            <a:r>
+              <a:rPr lang="en-US" sz="1200" b="1" dirty="0">
+                <a:solidFill>
+                  <a:schemeClr val="accent3"/>
+                </a:solidFill>
+              </a:rPr>
+              <a:t> </a:t>
+            </a:r>
+            <a:r>
+              <a:rPr lang="en-US" sz="1200" dirty="0"/>
+              <a:t>/</a:t>
+            </a:r>
+            <a:r>
+              <a:rPr lang="en-US" sz="1200" dirty="0" err="1"/>
+              <a:t>api</a:t>
+            </a:r>
+            <a:r>
+              <a:rPr lang="en-US" sz="1200" dirty="0"/>
+              <a:t>/presentations/{</a:t>
+            </a:r>
+            <a:r>
+              <a:rPr lang="en-US" sz="1200" dirty="0" err="1"/>
               <a:t>presentationId</a:t>
             </a:r>
             <a:r>
@@ -4128,138 +4251,6 @@
               <a:t>}/</a:t>
             </a:r>
             <a:r>
-              <a:rPr lang="en-US" sz="1200" dirty="0" err="1" smtClean="0"/>
-              <a:t>accessControl</a:t>
-            </a:r>
-            <a:endParaRPr lang="en-US" sz="1200" dirty="0" smtClean="0"/>
-          </a:p>
-          <a:p>
-            <a:r>
-              <a:rPr lang="en-US" sz="1200" b="1" dirty="0">
-                <a:solidFill>
-                  <a:schemeClr val="accent5"/>
-                </a:solidFill>
-              </a:rPr>
-              <a:t>POST </a:t>
-            </a:r>
-            <a:r>
-              <a:rPr lang="en-US" sz="1200" dirty="0"/>
-              <a:t>/</a:t>
-            </a:r>
-            <a:r>
-              <a:rPr lang="en-US" sz="1200" dirty="0" err="1"/>
-              <a:t>api</a:t>
-            </a:r>
-            <a:r>
-              <a:rPr lang="en-US" sz="1200" dirty="0"/>
-              <a:t>/presentations/{</a:t>
-            </a:r>
-            <a:r>
-              <a:rPr lang="en-US" sz="1200" dirty="0" err="1"/>
-              <a:t>presentationId</a:t>
-            </a:r>
-            <a:r>
-              <a:rPr lang="en-US" sz="1200" dirty="0"/>
-              <a:t>}/</a:t>
-            </a:r>
-            <a:r>
-              <a:rPr lang="en-US" sz="1200" dirty="0" err="1" smtClean="0"/>
-              <a:t>accessControl</a:t>
-            </a:r>
-            <a:endParaRPr lang="en-US" sz="1200" dirty="0" smtClean="0"/>
-          </a:p>
-          <a:p>
-            <a:r>
-              <a:rPr lang="en-US" sz="1200" b="1" dirty="0" smtClean="0">
-                <a:solidFill>
-                  <a:schemeClr val="accent6"/>
-                </a:solidFill>
-              </a:rPr>
-              <a:t>PUT</a:t>
-            </a:r>
-            <a:r>
-              <a:rPr lang="en-US" sz="1200" b="1" dirty="0" smtClean="0">
-                <a:solidFill>
-                  <a:schemeClr val="accent3"/>
-                </a:solidFill>
-              </a:rPr>
-              <a:t> </a:t>
-            </a:r>
-            <a:r>
-              <a:rPr lang="en-US" sz="1200" dirty="0" smtClean="0"/>
-              <a:t>/</a:t>
-            </a:r>
-            <a:r>
-              <a:rPr lang="en-US" sz="1200" dirty="0" err="1" smtClean="0"/>
-              <a:t>api</a:t>
-            </a:r>
-            <a:r>
-              <a:rPr lang="en-US" sz="1200" dirty="0" smtClean="0"/>
-              <a:t>/presentations/{</a:t>
-            </a:r>
-            <a:r>
-              <a:rPr lang="en-US" sz="1200" dirty="0" err="1" smtClean="0"/>
-              <a:t>presentationId</a:t>
-            </a:r>
-            <a:r>
-              <a:rPr lang="en-US" sz="1200" dirty="0" smtClean="0"/>
-              <a:t>}/</a:t>
-            </a:r>
-            <a:r>
-              <a:rPr lang="en-US" sz="1200" dirty="0" err="1" smtClean="0"/>
-              <a:t>accessControl</a:t>
-            </a:r>
-            <a:r>
-              <a:rPr lang="en-US" sz="1200" dirty="0" smtClean="0"/>
-              <a:t>/{</a:t>
-            </a:r>
-            <a:r>
-              <a:rPr lang="en-US" sz="1200" dirty="0" err="1" smtClean="0"/>
-              <a:t>accessControlId</a:t>
-            </a:r>
-            <a:r>
-              <a:rPr lang="en-US" sz="1200" dirty="0" smtClean="0"/>
-              <a:t>}</a:t>
-            </a:r>
-          </a:p>
-          <a:p>
-            <a:r>
-              <a:rPr lang="en-US" sz="1200" b="1" dirty="0" smtClean="0">
-                <a:solidFill>
-                  <a:schemeClr val="accent2"/>
-                </a:solidFill>
-              </a:rPr>
-              <a:t>DELETE</a:t>
-            </a:r>
-            <a:r>
-              <a:rPr lang="en-US" sz="1200" b="1" dirty="0" smtClean="0">
-                <a:solidFill>
-                  <a:schemeClr val="accent3"/>
-                </a:solidFill>
-              </a:rPr>
-              <a:t> </a:t>
-            </a:r>
-            <a:r>
-              <a:rPr lang="en-US" sz="1200" dirty="0"/>
-              <a:t>/</a:t>
-            </a:r>
-            <a:r>
-              <a:rPr lang="en-US" sz="1200" dirty="0" err="1"/>
-              <a:t>api</a:t>
-            </a:r>
-            <a:r>
-              <a:rPr lang="en-US" sz="1200" dirty="0"/>
-              <a:t>/presentations/{</a:t>
-            </a:r>
-            <a:r>
-              <a:rPr lang="en-US" sz="1200" dirty="0" err="1"/>
-              <a:t>presentationId</a:t>
-            </a:r>
-            <a:r>
-              <a:rPr lang="en-US" sz="1200" dirty="0"/>
-              <a:t>}/</a:t>
-            </a:r>
-            <a:r>
               <a:rPr lang="en-US" sz="1200" dirty="0" err="1"/>
               <a:t>accessControl</a:t>
             </a:r>
@@ -4272,10 +4263,9 @@
               <a:t>accessControlId</a:t>
             </a:r>
             <a:r>
-              <a:rPr lang="en-US" sz="1200" dirty="0" smtClean="0"/>
+              <a:rPr lang="en-US" sz="1200" dirty="0"/>
               <a:t>}</a:t>
             </a:r>
-            <a:endParaRPr lang="en-US" sz="1200" dirty="0"/>
           </a:p>
         </p:txBody>
       </p:sp>
@@ -4338,10 +4328,9 @@
               <a:t>presentationId</a:t>
             </a:r>
             <a:r>
-              <a:rPr lang="en-US" sz="1200" dirty="0" smtClean="0"/>
+              <a:rPr lang="en-US" sz="1200" dirty="0"/>
               <a:t>}/sections</a:t>
             </a:r>
-            <a:endParaRPr lang="en-US" sz="1200" dirty="0"/>
           </a:p>
           <a:p>
             <a:r>
@@ -4369,10 +4358,9 @@
               <a:t>presentationId</a:t>
             </a:r>
             <a:r>
-              <a:rPr lang="en-US" sz="1200" dirty="0" smtClean="0"/>
+              <a:rPr lang="en-US" sz="1200" dirty="0"/>
               <a:t>}/sections</a:t>
             </a:r>
-            <a:endParaRPr lang="en-US" sz="1200" dirty="0"/>
           </a:p>
           <a:p>
             <a:r>
@@ -4408,18 +4396,17 @@
               <a:t>presentationId</a:t>
             </a:r>
             <a:r>
-              <a:rPr lang="en-US" sz="1200" dirty="0" smtClean="0"/>
+              <a:rPr lang="en-US" sz="1200" dirty="0"/>
               <a:t>}/sections/{</a:t>
             </a:r>
             <a:r>
-              <a:rPr lang="en-US" sz="1200" dirty="0" err="1" smtClean="0"/>
+              <a:rPr lang="en-US" sz="1200" dirty="0" err="1"/>
               <a:t>sectionId</a:t>
             </a:r>
             <a:r>
-              <a:rPr lang="en-US" sz="1200" dirty="0" smtClean="0"/>
+              <a:rPr lang="en-US" sz="1200" dirty="0"/>
               <a:t>}</a:t>
             </a:r>
-            <a:endParaRPr lang="en-US" sz="1200" dirty="0"/>
           </a:p>
           <a:p>
             <a:r>
@@ -4455,18 +4442,17 @@
               <a:t>presentationId</a:t>
             </a:r>
             <a:r>
-              <a:rPr lang="en-US" sz="1200" dirty="0" smtClean="0"/>
+              <a:rPr lang="en-US" sz="1200" dirty="0"/>
               <a:t>}/sections/{</a:t>
             </a:r>
             <a:r>
-              <a:rPr lang="en-US" sz="1200" dirty="0" err="1" smtClean="0"/>
+              <a:rPr lang="en-US" sz="1200" dirty="0" err="1"/>
               <a:t>sectionId</a:t>
             </a:r>
             <a:r>
-              <a:rPr lang="en-US" sz="1200" dirty="0" smtClean="0"/>
+              <a:rPr lang="en-US" sz="1200" dirty="0"/>
               <a:t>}</a:t>
             </a:r>
-            <a:endParaRPr lang="en-US" sz="1200" dirty="0"/>
           </a:p>
         </p:txBody>
       </p:sp>
@@ -4505,21 +4491,21 @@
               <a:t>POST </a:t>
             </a:r>
             <a:r>
-              <a:rPr lang="en-US" sz="1200" dirty="0" smtClean="0"/>
+              <a:rPr lang="en-US" sz="1200" dirty="0"/>
               <a:t>/</a:t>
             </a:r>
             <a:r>
-              <a:rPr lang="en-US" sz="1200" dirty="0" err="1" smtClean="0"/>
+              <a:rPr lang="en-US" sz="1200" dirty="0" err="1"/>
               <a:t>api</a:t>
             </a:r>
             <a:r>
-              <a:rPr lang="en-US" sz="1200" dirty="0" smtClean="0"/>
+              <a:rPr lang="en-US" sz="1200" dirty="0"/>
               <a:t>/author</a:t>
             </a:r>
           </a:p>
           <a:p>
             <a:r>
-              <a:rPr lang="en-US" sz="1200" b="1" dirty="0" smtClean="0">
+              <a:rPr lang="en-US" sz="1200" b="1" dirty="0">
                 <a:solidFill>
                   <a:schemeClr val="accent5"/>
                 </a:solidFill>
@@ -4527,18 +4513,17 @@
               <a:t>POST </a:t>
             </a:r>
             <a:r>
-              <a:rPr lang="en-US" sz="1200" dirty="0" smtClean="0"/>
+              <a:rPr lang="en-US" sz="1200" dirty="0"/>
               <a:t>/</a:t>
             </a:r>
             <a:r>
-              <a:rPr lang="en-US" sz="1200" dirty="0" err="1" smtClean="0"/>
+              <a:rPr lang="en-US" sz="1200" dirty="0" err="1"/>
               <a:t>api</a:t>
             </a:r>
             <a:r>
-              <a:rPr lang="en-US" sz="1200" dirty="0" smtClean="0"/>
+              <a:rPr lang="en-US" sz="1200" dirty="0"/>
               <a:t>/review</a:t>
             </a:r>
-            <a:endParaRPr lang="en-US" sz="1200" dirty="0"/>
           </a:p>
           <a:p>
             <a:r>
@@ -4554,14 +4539,13 @@
               <a:t>/</a:t>
             </a:r>
             <a:r>
-              <a:rPr lang="en-US" sz="1200" dirty="0" err="1" smtClean="0"/>
+              <a:rPr lang="en-US" sz="1200" dirty="0" err="1"/>
               <a:t>api</a:t>
             </a:r>
             <a:r>
-              <a:rPr lang="en-US" sz="1200" dirty="0" smtClean="0"/>
+              <a:rPr lang="en-US" sz="1200" dirty="0"/>
               <a:t>/submission</a:t>
             </a:r>
-            <a:endParaRPr lang="en-US" sz="1200" dirty="0"/>
           </a:p>
         </p:txBody>
       </p:sp>
@@ -4592,7 +4576,7 @@
           <a:lstStyle/>
           <a:p>
             <a:r>
-              <a:rPr lang="en-US" sz="1200" b="1" smtClean="0">
+              <a:rPr lang="en-US" sz="1200" b="1">
                 <a:solidFill>
                   <a:schemeClr val="accent3"/>
                 </a:solidFill>
@@ -4600,7 +4584,7 @@
               <a:t>GET</a:t>
             </a:r>
             <a:r>
-              <a:rPr lang="en-US" sz="1200" b="1" smtClean="0">
+              <a:rPr lang="en-US" sz="1200" b="1">
                 <a:solidFill>
                   <a:schemeClr val="accent5"/>
                 </a:solidFill>
@@ -4608,7 +4592,7 @@
               <a:t> </a:t>
             </a:r>
             <a:r>
-              <a:rPr lang="en-US" sz="1200" smtClean="0"/>
+              <a:rPr lang="en-US" sz="1200"/>
               <a:t>/web/*</a:t>
             </a:r>
             <a:endParaRPr lang="en-US" sz="1200" dirty="0"/>
@@ -4624,7 +4608,7 @@
         <p:spPr>
           <a:xfrm>
             <a:off x="3349515" y="3174459"/>
-            <a:ext cx="2916119" cy="1015663"/>
+            <a:ext cx="2118016" cy="1015663"/>
           </a:xfrm>
           <a:prstGeom prst="rect">
             <a:avLst/>
@@ -4642,7 +4626,7 @@
           <a:lstStyle/>
           <a:p>
             <a:r>
-              <a:rPr lang="en-US" sz="1200" b="1" dirty="0" smtClean="0">
+              <a:rPr lang="en-US" sz="1200" b="1" dirty="0">
                 <a:solidFill>
                   <a:schemeClr val="accent3"/>
                 </a:solidFill>
@@ -4650,7 +4634,7 @@
               <a:t>GET</a:t>
             </a:r>
             <a:r>
-              <a:rPr lang="en-US" sz="1200" b="1" dirty="0" smtClean="0">
+              <a:rPr lang="en-US" sz="1200" b="1" dirty="0">
                 <a:solidFill>
                   <a:schemeClr val="accent5"/>
                 </a:solidFill>
@@ -4658,21 +4642,21 @@
               <a:t> </a:t>
             </a:r>
             <a:r>
-              <a:rPr lang="en-US" sz="1200" dirty="0" smtClean="0"/>
+              <a:rPr lang="en-US" sz="1200" dirty="0"/>
               <a:t>/</a:t>
             </a:r>
             <a:r>
-              <a:rPr lang="en-US" sz="1200" dirty="0" err="1" smtClean="0"/>
+              <a:rPr lang="en-US" sz="1200" dirty="0" err="1"/>
               <a:t>api</a:t>
             </a:r>
             <a:r>
-              <a:rPr lang="en-US" sz="1200" dirty="0" smtClean="0"/>
+              <a:rPr lang="en-US" sz="1200" dirty="0"/>
               <a:t>/presentations</a:t>
             </a:r>
           </a:p>
           <a:p>
             <a:r>
-              <a:rPr lang="en-US" sz="1200" b="1" dirty="0" smtClean="0">
+              <a:rPr lang="en-US" sz="1200" b="1" dirty="0">
                 <a:solidFill>
                   <a:schemeClr val="accent5"/>
                 </a:solidFill>
@@ -4684,11 +4668,11 @@
               <a:t>/</a:t>
             </a:r>
             <a:r>
-              <a:rPr lang="en-US" sz="1200" dirty="0" err="1" smtClean="0"/>
+              <a:rPr lang="en-US" sz="1200" dirty="0" err="1"/>
               <a:t>api</a:t>
             </a:r>
             <a:r>
-              <a:rPr lang="en-US" sz="1200" dirty="0" smtClean="0"/>
+              <a:rPr lang="en-US" sz="1200" dirty="0"/>
               <a:t>/presentations</a:t>
             </a:r>
           </a:p>
@@ -4719,20 +4703,12 @@
             </a:r>
             <a:r>
               <a:rPr lang="en-US" sz="1200" dirty="0"/>
-              <a:t>/presentations/{</a:t>
-            </a:r>
-            <a:r>
-              <a:rPr lang="en-US" sz="1200" dirty="0" err="1" smtClean="0"/>
-              <a:t>presentationId</a:t>
-            </a:r>
-            <a:r>
-              <a:rPr lang="en-US" sz="1200" dirty="0" smtClean="0"/>
-              <a:t>}</a:t>
-            </a:r>
-          </a:p>
-          <a:p>
-            <a:r>
-              <a:rPr lang="en-US" sz="1200" b="1" dirty="0" smtClean="0">
+              <a:t>/presentations/{id}</a:t>
+            </a:r>
+          </a:p>
+          <a:p>
+            <a:r>
+              <a:rPr lang="en-US" sz="1200" b="1" dirty="0">
                 <a:solidFill>
                   <a:schemeClr val="accent3"/>
                 </a:solidFill>
@@ -4740,7 +4716,7 @@
               <a:t>GET</a:t>
             </a:r>
             <a:r>
-              <a:rPr lang="en-US" sz="1200" b="1" dirty="0" smtClean="0">
+              <a:rPr lang="en-US" sz="1200" b="1" dirty="0">
                 <a:solidFill>
                   <a:schemeClr val="accent6"/>
                 </a:solidFill>
@@ -4748,34 +4724,21 @@
               <a:t> </a:t>
             </a:r>
             <a:r>
-              <a:rPr lang="en-US" sz="1200" dirty="0" smtClean="0"/>
+              <a:rPr lang="en-US" sz="1200" dirty="0"/>
               <a:t>/</a:t>
             </a:r>
             <a:r>
-              <a:rPr lang="en-US" sz="1200" dirty="0" err="1" smtClean="0"/>
+              <a:rPr lang="en-US" sz="1200" dirty="0" err="1"/>
               <a:t>api</a:t>
             </a:r>
             <a:r>
-              <a:rPr lang="en-US" sz="1200" dirty="0" smtClean="0"/>
-              <a:t>/presentations</a:t>
-            </a:r>
-            <a:r>
               <a:rPr lang="en-US" sz="1200" dirty="0"/>
-              <a:t>/{</a:t>
-            </a:r>
-            <a:r>
-              <a:rPr lang="en-US" sz="1200" dirty="0" err="1" smtClean="0"/>
-              <a:t>presentationId</a:t>
-            </a:r>
-            <a:r>
-              <a:rPr lang="en-US" sz="1200" smtClean="0"/>
-              <a:t>}</a:t>
-            </a:r>
-            <a:endParaRPr lang="en-US" sz="1200" dirty="0" smtClean="0"/>
-          </a:p>
-          <a:p>
-            <a:r>
-              <a:rPr lang="en-US" sz="1200" b="1" dirty="0" smtClean="0">
+              <a:t>/presentations/{id}</a:t>
+            </a:r>
+          </a:p>
+          <a:p>
+            <a:r>
+              <a:rPr lang="en-US" sz="1200" b="1" dirty="0">
                 <a:solidFill>
                   <a:schemeClr val="accent2"/>
                 </a:solidFill>
@@ -4783,7 +4746,7 @@
               <a:t>DELETE</a:t>
             </a:r>
             <a:r>
-              <a:rPr lang="en-US" sz="1200" b="1" dirty="0" smtClean="0">
+              <a:rPr lang="en-US" sz="1200" b="1" dirty="0">
                 <a:solidFill>
                   <a:schemeClr val="accent3"/>
                 </a:solidFill>
@@ -4800,17 +4763,8 @@
             </a:r>
             <a:r>
               <a:rPr lang="en-US" sz="1200" dirty="0"/>
-              <a:t>/presentations/{</a:t>
-            </a:r>
-            <a:r>
-              <a:rPr lang="en-US" sz="1200" dirty="0" err="1"/>
-              <a:t>presentationId</a:t>
-            </a:r>
-            <a:r>
-              <a:rPr lang="en-US" sz="1200" dirty="0" smtClean="0"/>
-              <a:t>}</a:t>
-            </a:r>
-            <a:endParaRPr lang="en-US" sz="1200" dirty="0"/>
+              <a:t>/presentations/{id}</a:t>
+            </a:r>
           </a:p>
         </p:txBody>
       </p:sp>

</xml_diff>